<commit_message>
Example figures in each readme (#487)
Added example figures for image classification and object detection
</commit_message>
<xml_diff>
--- a/scenarios/media/figures.pptx
+++ b/scenarios/media/figures.pptx
@@ -12,6 +12,7 @@
     <p:sldId id="258" r:id="rId6"/>
     <p:sldId id="259" r:id="rId7"/>
     <p:sldId id="1449" r:id="rId8"/>
+    <p:sldId id="1450" r:id="rId9"/>
   </p:sldIdLst>
   <p:sldSz cx="12192000" cy="6858000"/>
   <p:notesSz cx="6858000" cy="9144000"/>
@@ -265,7 +266,7 @@
           <a:p>
             <a:fld id="{4A8D7B51-23EF-4970-8150-2BD12F42C3C7}" type="datetimeFigureOut">
               <a:rPr lang="en-US" smtClean="0"/>
-              <a:t>1/22/2020</a:t>
+              <a:t>2/5/2020</a:t>
             </a:fld>
             <a:endParaRPr lang="en-US"/>
           </a:p>
@@ -463,7 +464,7 @@
           <a:p>
             <a:fld id="{4A8D7B51-23EF-4970-8150-2BD12F42C3C7}" type="datetimeFigureOut">
               <a:rPr lang="en-US" smtClean="0"/>
-              <a:t>1/22/2020</a:t>
+              <a:t>2/5/2020</a:t>
             </a:fld>
             <a:endParaRPr lang="en-US"/>
           </a:p>
@@ -671,7 +672,7 @@
           <a:p>
             <a:fld id="{4A8D7B51-23EF-4970-8150-2BD12F42C3C7}" type="datetimeFigureOut">
               <a:rPr lang="en-US" smtClean="0"/>
-              <a:t>1/22/2020</a:t>
+              <a:t>2/5/2020</a:t>
             </a:fld>
             <a:endParaRPr lang="en-US"/>
           </a:p>
@@ -869,7 +870,7 @@
           <a:p>
             <a:fld id="{4A8D7B51-23EF-4970-8150-2BD12F42C3C7}" type="datetimeFigureOut">
               <a:rPr lang="en-US" smtClean="0"/>
-              <a:t>1/22/2020</a:t>
+              <a:t>2/5/2020</a:t>
             </a:fld>
             <a:endParaRPr lang="en-US"/>
           </a:p>
@@ -1144,7 +1145,7 @@
           <a:p>
             <a:fld id="{4A8D7B51-23EF-4970-8150-2BD12F42C3C7}" type="datetimeFigureOut">
               <a:rPr lang="en-US" smtClean="0"/>
-              <a:t>1/22/2020</a:t>
+              <a:t>2/5/2020</a:t>
             </a:fld>
             <a:endParaRPr lang="en-US"/>
           </a:p>
@@ -1409,7 +1410,7 @@
           <a:p>
             <a:fld id="{4A8D7B51-23EF-4970-8150-2BD12F42C3C7}" type="datetimeFigureOut">
               <a:rPr lang="en-US" smtClean="0"/>
-              <a:t>1/22/2020</a:t>
+              <a:t>2/5/2020</a:t>
             </a:fld>
             <a:endParaRPr lang="en-US"/>
           </a:p>
@@ -1821,7 +1822,7 @@
           <a:p>
             <a:fld id="{4A8D7B51-23EF-4970-8150-2BD12F42C3C7}" type="datetimeFigureOut">
               <a:rPr lang="en-US" smtClean="0"/>
-              <a:t>1/22/2020</a:t>
+              <a:t>2/5/2020</a:t>
             </a:fld>
             <a:endParaRPr lang="en-US"/>
           </a:p>
@@ -1962,7 +1963,7 @@
           <a:p>
             <a:fld id="{4A8D7B51-23EF-4970-8150-2BD12F42C3C7}" type="datetimeFigureOut">
               <a:rPr lang="en-US" smtClean="0"/>
-              <a:t>1/22/2020</a:t>
+              <a:t>2/5/2020</a:t>
             </a:fld>
             <a:endParaRPr lang="en-US"/>
           </a:p>
@@ -2075,7 +2076,7 @@
           <a:p>
             <a:fld id="{4A8D7B51-23EF-4970-8150-2BD12F42C3C7}" type="datetimeFigureOut">
               <a:rPr lang="en-US" smtClean="0"/>
-              <a:t>1/22/2020</a:t>
+              <a:t>2/5/2020</a:t>
             </a:fld>
             <a:endParaRPr lang="en-US"/>
           </a:p>
@@ -2386,7 +2387,7 @@
           <a:p>
             <a:fld id="{4A8D7B51-23EF-4970-8150-2BD12F42C3C7}" type="datetimeFigureOut">
               <a:rPr lang="en-US" smtClean="0"/>
-              <a:t>1/22/2020</a:t>
+              <a:t>2/5/2020</a:t>
             </a:fld>
             <a:endParaRPr lang="en-US"/>
           </a:p>
@@ -2674,7 +2675,7 @@
           <a:p>
             <a:fld id="{4A8D7B51-23EF-4970-8150-2BD12F42C3C7}" type="datetimeFigureOut">
               <a:rPr lang="en-US" smtClean="0"/>
-              <a:t>1/22/2020</a:t>
+              <a:t>2/5/2020</a:t>
             </a:fld>
             <a:endParaRPr lang="en-US"/>
           </a:p>
@@ -2915,7 +2916,7 @@
           <a:p>
             <a:fld id="{4A8D7B51-23EF-4970-8150-2BD12F42C3C7}" type="datetimeFigureOut">
               <a:rPr lang="en-US" smtClean="0"/>
-              <a:t>1/22/2020</a:t>
+              <a:t>2/5/2020</a:t>
             </a:fld>
             <a:endParaRPr lang="en-US"/>
           </a:p>
@@ -5668,12 +5669,20 @@
           <a:lstStyle/>
           <a:p>
             <a:r>
+              <a:rPr lang="en-US" b="1" dirty="0">
+                <a:solidFill>
+                  <a:schemeClr val="bg1"/>
+                </a:solidFill>
+              </a:rPr>
+              <a:t>Label</a:t>
+            </a:r>
+            <a:r>
               <a:rPr lang="en-US" dirty="0">
                 <a:solidFill>
                   <a:schemeClr val="bg1"/>
                 </a:solidFill>
               </a:rPr>
-              <a:t>Label: cup</a:t>
+              <a:t>: cup</a:t>
             </a:r>
             <a:br>
               <a:rPr lang="en-US" dirty="0">
@@ -5683,12 +5692,20 @@
               </a:rPr>
             </a:br>
             <a:r>
+              <a:rPr lang="en-US" b="1" dirty="0">
+                <a:solidFill>
+                  <a:schemeClr val="bg1"/>
+                </a:solidFill>
+              </a:rPr>
+              <a:t>Confidence</a:t>
+            </a:r>
+            <a:r>
               <a:rPr lang="en-US" dirty="0">
                 <a:solidFill>
                   <a:schemeClr val="bg1"/>
                 </a:solidFill>
               </a:rPr>
-              <a:t>Confidence: 99%</a:t>
+              <a:t>: 99%</a:t>
             </a:r>
           </a:p>
         </p:txBody>
@@ -5732,6 +5749,302 @@
     <p:extLst>
       <p:ext uri="{BB962C8B-B14F-4D97-AF65-F5344CB8AC3E}">
         <p14:creationId xmlns:p14="http://schemas.microsoft.com/office/powerpoint/2010/main" val="157510964"/>
+      </p:ext>
+    </p:extLst>
+  </p:cSld>
+  <p:clrMapOvr>
+    <a:masterClrMapping/>
+  </p:clrMapOvr>
+</p:sld>
+</file>
+
+<file path=ppt/slides/slide8.xml><?xml version="1.0" encoding="utf-8"?>
+<p:sld xmlns:a="http://schemas.openxmlformats.org/drawingml/2006/main" xmlns:r="http://schemas.openxmlformats.org/officeDocument/2006/relationships" xmlns:p="http://schemas.openxmlformats.org/presentationml/2006/main">
+  <p:cSld>
+    <p:spTree>
+      <p:nvGrpSpPr>
+        <p:cNvPr id="1" name=""/>
+        <p:cNvGrpSpPr/>
+        <p:nvPr/>
+      </p:nvGrpSpPr>
+      <p:grpSpPr>
+        <a:xfrm>
+          <a:off x="0" y="0"/>
+          <a:ext cx="0" cy="0"/>
+          <a:chOff x="0" y="0"/>
+          <a:chExt cx="0" cy="0"/>
+        </a:xfrm>
+      </p:grpSpPr>
+      <p:pic>
+        <p:nvPicPr>
+          <p:cNvPr id="5" name="Picture 4" descr="A plastic water bottle on a table&#10;&#10;Description automatically generated">
+            <a:extLst>
+              <a:ext uri="{FF2B5EF4-FFF2-40B4-BE49-F238E27FC236}">
+                <a16:creationId xmlns:a16="http://schemas.microsoft.com/office/drawing/2014/main" id="{0040CB42-F87A-4E95-A938-F7E2C3060A65}"/>
+              </a:ext>
+            </a:extLst>
+          </p:cNvPr>
+          <p:cNvPicPr>
+            <a:picLocks noChangeAspect="1"/>
+          </p:cNvPicPr>
+          <p:nvPr/>
+        </p:nvPicPr>
+        <p:blipFill>
+          <a:blip r:embed="rId2">
+            <a:extLst>
+              <a:ext uri="{28A0092B-C50C-407E-A947-70E740481C1C}">
+                <a14:useLocalDpi xmlns:a14="http://schemas.microsoft.com/office/drawing/2010/main" val="0"/>
+              </a:ext>
+            </a:extLst>
+          </a:blip>
+          <a:stretch>
+            <a:fillRect/>
+          </a:stretch>
+        </p:blipFill>
+        <p:spPr>
+          <a:xfrm>
+            <a:off x="6549424" y="0"/>
+            <a:ext cx="5138351" cy="6858000"/>
+          </a:xfrm>
+          <a:prstGeom prst="rect">
+            <a:avLst/>
+          </a:prstGeom>
+        </p:spPr>
+      </p:pic>
+      <p:sp>
+        <p:nvSpPr>
+          <p:cNvPr id="2" name="TextBox 1">
+            <a:extLst>
+              <a:ext uri="{FF2B5EF4-FFF2-40B4-BE49-F238E27FC236}">
+                <a16:creationId xmlns:a16="http://schemas.microsoft.com/office/drawing/2014/main" id="{BA541CB7-EE52-4D05-AA4B-1B5BF6A6371B}"/>
+              </a:ext>
+            </a:extLst>
+          </p:cNvPr>
+          <p:cNvSpPr txBox="1"/>
+          <p:nvPr/>
+        </p:nvSpPr>
+        <p:spPr>
+          <a:xfrm>
+            <a:off x="6682802" y="5867714"/>
+            <a:ext cx="4690451" cy="954107"/>
+          </a:xfrm>
+          <a:prstGeom prst="rect">
+            <a:avLst/>
+          </a:prstGeom>
+          <a:noFill/>
+        </p:spPr>
+        <p:txBody>
+          <a:bodyPr wrap="none" rtlCol="0">
+            <a:spAutoFit/>
+          </a:bodyPr>
+          <a:lstStyle/>
+          <a:p>
+            <a:r>
+              <a:rPr lang="en-US" sz="2800" b="1" dirty="0">
+                <a:solidFill>
+                  <a:schemeClr val="bg1"/>
+                </a:solidFill>
+              </a:rPr>
+              <a:t>Labels</a:t>
+            </a:r>
+            <a:r>
+              <a:rPr lang="en-US" sz="2800" dirty="0">
+                <a:solidFill>
+                  <a:schemeClr val="bg1"/>
+                </a:solidFill>
+              </a:rPr>
+              <a:t>: bottle, can, milk_bottle</a:t>
+            </a:r>
+            <a:br>
+              <a:rPr lang="en-US" sz="2800" dirty="0">
+                <a:solidFill>
+                  <a:schemeClr val="bg1"/>
+                </a:solidFill>
+              </a:rPr>
+            </a:br>
+            <a:r>
+              <a:rPr lang="en-US" sz="2800" b="1" dirty="0">
+                <a:solidFill>
+                  <a:schemeClr val="bg1"/>
+                </a:solidFill>
+              </a:rPr>
+              <a:t>Confidence</a:t>
+            </a:r>
+            <a:r>
+              <a:rPr lang="en-US" sz="2800" dirty="0">
+                <a:solidFill>
+                  <a:schemeClr val="bg1"/>
+                </a:solidFill>
+              </a:rPr>
+              <a:t>: 93%, 99%, 96%</a:t>
+            </a:r>
+          </a:p>
+        </p:txBody>
+      </p:sp>
+      <p:pic>
+        <p:nvPicPr>
+          <p:cNvPr id="10" name="Picture 9" descr="A picture containing indoor, sitting, food, table&#10;&#10;Description automatically generated">
+            <a:extLst>
+              <a:ext uri="{FF2B5EF4-FFF2-40B4-BE49-F238E27FC236}">
+                <a16:creationId xmlns:a16="http://schemas.microsoft.com/office/drawing/2014/main" id="{FECF6F8D-5009-4138-A93F-9966EFF57095}"/>
+              </a:ext>
+            </a:extLst>
+          </p:cNvPr>
+          <p:cNvPicPr>
+            <a:picLocks noChangeAspect="1"/>
+          </p:cNvPicPr>
+          <p:nvPr/>
+        </p:nvPicPr>
+        <p:blipFill>
+          <a:blip r:embed="rId3">
+            <a:extLst>
+              <a:ext uri="{28A0092B-C50C-407E-A947-70E740481C1C}">
+                <a14:useLocalDpi xmlns:a14="http://schemas.microsoft.com/office/drawing/2010/main" val="0"/>
+              </a:ext>
+            </a:extLst>
+          </a:blip>
+          <a:stretch>
+            <a:fillRect/>
+          </a:stretch>
+        </p:blipFill>
+        <p:spPr>
+          <a:xfrm>
+            <a:off x="504225" y="0"/>
+            <a:ext cx="5138351" cy="6858000"/>
+          </a:xfrm>
+          <a:prstGeom prst="rect">
+            <a:avLst/>
+          </a:prstGeom>
+        </p:spPr>
+      </p:pic>
+      <p:sp>
+        <p:nvSpPr>
+          <p:cNvPr id="12" name="TextBox 11">
+            <a:extLst>
+              <a:ext uri="{FF2B5EF4-FFF2-40B4-BE49-F238E27FC236}">
+                <a16:creationId xmlns:a16="http://schemas.microsoft.com/office/drawing/2014/main" id="{852A0103-A078-4C90-A9D3-F8551D0B85CA}"/>
+              </a:ext>
+            </a:extLst>
+          </p:cNvPr>
+          <p:cNvSpPr txBox="1"/>
+          <p:nvPr/>
+        </p:nvSpPr>
+        <p:spPr>
+          <a:xfrm>
+            <a:off x="715474" y="5903893"/>
+            <a:ext cx="2657779" cy="954107"/>
+          </a:xfrm>
+          <a:prstGeom prst="rect">
+            <a:avLst/>
+          </a:prstGeom>
+          <a:noFill/>
+        </p:spPr>
+        <p:txBody>
+          <a:bodyPr wrap="none" rtlCol="0">
+            <a:spAutoFit/>
+          </a:bodyPr>
+          <a:lstStyle/>
+          <a:p>
+            <a:r>
+              <a:rPr lang="en-US" sz="2800" b="1" dirty="0">
+                <a:solidFill>
+                  <a:schemeClr val="bg1"/>
+                </a:solidFill>
+              </a:rPr>
+              <a:t>Label</a:t>
+            </a:r>
+            <a:r>
+              <a:rPr lang="en-US" sz="2800" dirty="0">
+                <a:solidFill>
+                  <a:schemeClr val="bg1"/>
+                </a:solidFill>
+              </a:rPr>
+              <a:t>: bottle</a:t>
+            </a:r>
+            <a:br>
+              <a:rPr lang="en-US" sz="2800" dirty="0">
+                <a:solidFill>
+                  <a:schemeClr val="bg1"/>
+                </a:solidFill>
+              </a:rPr>
+            </a:br>
+            <a:r>
+              <a:rPr lang="en-US" sz="2800" b="1" dirty="0">
+                <a:solidFill>
+                  <a:schemeClr val="bg1"/>
+                </a:solidFill>
+              </a:rPr>
+              <a:t>Confidence</a:t>
+            </a:r>
+            <a:r>
+              <a:rPr lang="en-US" sz="2800" dirty="0">
+                <a:solidFill>
+                  <a:schemeClr val="bg1"/>
+                </a:solidFill>
+              </a:rPr>
+              <a:t>: 99%</a:t>
+            </a:r>
+          </a:p>
+        </p:txBody>
+      </p:sp>
+      <p:sp>
+        <p:nvSpPr>
+          <p:cNvPr id="11" name="Rectangle 10">
+            <a:extLst>
+              <a:ext uri="{FF2B5EF4-FFF2-40B4-BE49-F238E27FC236}">
+                <a16:creationId xmlns:a16="http://schemas.microsoft.com/office/drawing/2014/main" id="{B390E27A-2CA4-4E59-90E5-81C07F3323FF}"/>
+              </a:ext>
+            </a:extLst>
+          </p:cNvPr>
+          <p:cNvSpPr/>
+          <p:nvPr/>
+        </p:nvSpPr>
+        <p:spPr>
+          <a:xfrm>
+            <a:off x="0" y="-241300"/>
+            <a:ext cx="11798300" cy="1270000"/>
+          </a:xfrm>
+          <a:prstGeom prst="rect">
+            <a:avLst/>
+          </a:prstGeom>
+          <a:solidFill>
+            <a:schemeClr val="bg1"/>
+          </a:solidFill>
+          <a:ln>
+            <a:solidFill>
+              <a:schemeClr val="bg1"/>
+            </a:solidFill>
+          </a:ln>
+        </p:spPr>
+        <p:style>
+          <a:lnRef idx="2">
+            <a:schemeClr val="accent1">
+              <a:shade val="50000"/>
+            </a:schemeClr>
+          </a:lnRef>
+          <a:fillRef idx="1">
+            <a:schemeClr val="accent1"/>
+          </a:fillRef>
+          <a:effectRef idx="0">
+            <a:schemeClr val="accent1"/>
+          </a:effectRef>
+          <a:fontRef idx="minor">
+            <a:schemeClr val="lt1"/>
+          </a:fontRef>
+        </p:style>
+        <p:txBody>
+          <a:bodyPr rtlCol="0" anchor="ctr"/>
+          <a:lstStyle/>
+          <a:p>
+            <a:pPr algn="ctr"/>
+            <a:endParaRPr lang="en-US"/>
+          </a:p>
+        </p:txBody>
+      </p:sp>
+    </p:spTree>
+    <p:extLst>
+      <p:ext uri="{BB962C8B-B14F-4D97-AF65-F5344CB8AC3E}">
+        <p14:creationId xmlns:p14="http://schemas.microsoft.com/office/powerpoint/2010/main" val="3250943964"/>
       </p:ext>
     </p:extLst>
   </p:cSld>

</xml_diff>

<commit_message>
added new overview image
</commit_message>
<xml_diff>
--- a/scenarios/media/figures.pptx
+++ b/scenarios/media/figures.pptx
@@ -12,7 +12,8 @@
     <p:sldId id="258" r:id="rId6"/>
     <p:sldId id="259" r:id="rId7"/>
     <p:sldId id="1449" r:id="rId8"/>
-    <p:sldId id="1450" r:id="rId9"/>
+    <p:sldId id="1451" r:id="rId9"/>
+    <p:sldId id="1450" r:id="rId10"/>
   </p:sldIdLst>
   <p:sldSz cx="12192000" cy="6858000"/>
   <p:notesSz cx="6858000" cy="9144000"/>
@@ -266,7 +267,7 @@
           <a:p>
             <a:fld id="{4A8D7B51-23EF-4970-8150-2BD12F42C3C7}" type="datetimeFigureOut">
               <a:rPr lang="en-US" smtClean="0"/>
-              <a:t>2/5/2020</a:t>
+              <a:t>6/9/2020</a:t>
             </a:fld>
             <a:endParaRPr lang="en-US"/>
           </a:p>
@@ -464,7 +465,7 @@
           <a:p>
             <a:fld id="{4A8D7B51-23EF-4970-8150-2BD12F42C3C7}" type="datetimeFigureOut">
               <a:rPr lang="en-US" smtClean="0"/>
-              <a:t>2/5/2020</a:t>
+              <a:t>6/9/2020</a:t>
             </a:fld>
             <a:endParaRPr lang="en-US"/>
           </a:p>
@@ -672,7 +673,7 @@
           <a:p>
             <a:fld id="{4A8D7B51-23EF-4970-8150-2BD12F42C3C7}" type="datetimeFigureOut">
               <a:rPr lang="en-US" smtClean="0"/>
-              <a:t>2/5/2020</a:t>
+              <a:t>6/9/2020</a:t>
             </a:fld>
             <a:endParaRPr lang="en-US"/>
           </a:p>
@@ -870,7 +871,7 @@
           <a:p>
             <a:fld id="{4A8D7B51-23EF-4970-8150-2BD12F42C3C7}" type="datetimeFigureOut">
               <a:rPr lang="en-US" smtClean="0"/>
-              <a:t>2/5/2020</a:t>
+              <a:t>6/9/2020</a:t>
             </a:fld>
             <a:endParaRPr lang="en-US"/>
           </a:p>
@@ -1145,7 +1146,7 @@
           <a:p>
             <a:fld id="{4A8D7B51-23EF-4970-8150-2BD12F42C3C7}" type="datetimeFigureOut">
               <a:rPr lang="en-US" smtClean="0"/>
-              <a:t>2/5/2020</a:t>
+              <a:t>6/9/2020</a:t>
             </a:fld>
             <a:endParaRPr lang="en-US"/>
           </a:p>
@@ -1410,7 +1411,7 @@
           <a:p>
             <a:fld id="{4A8D7B51-23EF-4970-8150-2BD12F42C3C7}" type="datetimeFigureOut">
               <a:rPr lang="en-US" smtClean="0"/>
-              <a:t>2/5/2020</a:t>
+              <a:t>6/9/2020</a:t>
             </a:fld>
             <a:endParaRPr lang="en-US"/>
           </a:p>
@@ -1822,7 +1823,7 @@
           <a:p>
             <a:fld id="{4A8D7B51-23EF-4970-8150-2BD12F42C3C7}" type="datetimeFigureOut">
               <a:rPr lang="en-US" smtClean="0"/>
-              <a:t>2/5/2020</a:t>
+              <a:t>6/9/2020</a:t>
             </a:fld>
             <a:endParaRPr lang="en-US"/>
           </a:p>
@@ -1963,7 +1964,7 @@
           <a:p>
             <a:fld id="{4A8D7B51-23EF-4970-8150-2BD12F42C3C7}" type="datetimeFigureOut">
               <a:rPr lang="en-US" smtClean="0"/>
-              <a:t>2/5/2020</a:t>
+              <a:t>6/9/2020</a:t>
             </a:fld>
             <a:endParaRPr lang="en-US"/>
           </a:p>
@@ -2076,7 +2077,7 @@
           <a:p>
             <a:fld id="{4A8D7B51-23EF-4970-8150-2BD12F42C3C7}" type="datetimeFigureOut">
               <a:rPr lang="en-US" smtClean="0"/>
-              <a:t>2/5/2020</a:t>
+              <a:t>6/9/2020</a:t>
             </a:fld>
             <a:endParaRPr lang="en-US"/>
           </a:p>
@@ -2387,7 +2388,7 @@
           <a:p>
             <a:fld id="{4A8D7B51-23EF-4970-8150-2BD12F42C3C7}" type="datetimeFigureOut">
               <a:rPr lang="en-US" smtClean="0"/>
-              <a:t>2/5/2020</a:t>
+              <a:t>6/9/2020</a:t>
             </a:fld>
             <a:endParaRPr lang="en-US"/>
           </a:p>
@@ -2675,7 +2676,7 @@
           <a:p>
             <a:fld id="{4A8D7B51-23EF-4970-8150-2BD12F42C3C7}" type="datetimeFigureOut">
               <a:rPr lang="en-US" smtClean="0"/>
-              <a:t>2/5/2020</a:t>
+              <a:t>6/9/2020</a:t>
             </a:fld>
             <a:endParaRPr lang="en-US"/>
           </a:p>
@@ -2916,7 +2917,7 @@
           <a:p>
             <a:fld id="{4A8D7B51-23EF-4970-8150-2BD12F42C3C7}" type="datetimeFigureOut">
               <a:rPr lang="en-US" smtClean="0"/>
-              <a:t>2/5/2020</a:t>
+              <a:t>6/9/2020</a:t>
             </a:fld>
             <a:endParaRPr lang="en-US"/>
           </a:p>
@@ -5777,6 +5778,350 @@
       </p:grpSpPr>
       <p:pic>
         <p:nvPicPr>
+          <p:cNvPr id="4" name="Picture 6">
+            <a:extLst>
+              <a:ext uri="{FF2B5EF4-FFF2-40B4-BE49-F238E27FC236}">
+                <a16:creationId xmlns:a16="http://schemas.microsoft.com/office/drawing/2014/main" id="{C76889AB-A7B7-4F7D-A711-44B611B2B9B2}"/>
+              </a:ext>
+            </a:extLst>
+          </p:cNvPr>
+          <p:cNvPicPr>
+            <a:picLocks noChangeAspect="1" noChangeArrowheads="1"/>
+          </p:cNvPicPr>
+          <p:nvPr/>
+        </p:nvPicPr>
+        <p:blipFill>
+          <a:blip r:embed="rId2">
+            <a:extLst>
+              <a:ext uri="{28A0092B-C50C-407E-A947-70E740481C1C}">
+                <a14:useLocalDpi xmlns:a14="http://schemas.microsoft.com/office/drawing/2010/main" val="0"/>
+              </a:ext>
+            </a:extLst>
+          </a:blip>
+          <a:srcRect/>
+          <a:stretch>
+            <a:fillRect/>
+          </a:stretch>
+        </p:blipFill>
+        <p:spPr bwMode="auto">
+          <a:xfrm>
+            <a:off x="7324111" y="3005657"/>
+            <a:ext cx="2071568" cy="1946961"/>
+          </a:xfrm>
+          <a:prstGeom prst="rect">
+            <a:avLst/>
+          </a:prstGeom>
+          <a:noFill/>
+          <a:ln>
+            <a:solidFill>
+              <a:srgbClr val="0070C0"/>
+            </a:solidFill>
+          </a:ln>
+          <a:extLst>
+            <a:ext uri="{909E8E84-426E-40DD-AFC4-6F175D3DCCD1}">
+              <a14:hiddenFill xmlns:a14="http://schemas.microsoft.com/office/drawing/2010/main">
+                <a:solidFill>
+                  <a:srgbClr val="FFFFFF"/>
+                </a:solidFill>
+              </a14:hiddenFill>
+            </a:ext>
+          </a:extLst>
+        </p:spPr>
+      </p:pic>
+      <p:pic>
+        <p:nvPicPr>
+          <p:cNvPr id="8" name="Picture 7">
+            <a:extLst>
+              <a:ext uri="{FF2B5EF4-FFF2-40B4-BE49-F238E27FC236}">
+                <a16:creationId xmlns:a16="http://schemas.microsoft.com/office/drawing/2014/main" id="{80D2613F-75BB-4C54-B2DB-B87FD52E3412}"/>
+              </a:ext>
+            </a:extLst>
+          </p:cNvPr>
+          <p:cNvPicPr>
+            <a:picLocks noChangeAspect="1"/>
+          </p:cNvPicPr>
+          <p:nvPr/>
+        </p:nvPicPr>
+        <p:blipFill>
+          <a:blip r:embed="rId3"/>
+          <a:stretch>
+            <a:fillRect/>
+          </a:stretch>
+        </p:blipFill>
+        <p:spPr>
+          <a:xfrm>
+            <a:off x="725714" y="677992"/>
+            <a:ext cx="2760260" cy="2242317"/>
+          </a:xfrm>
+          <a:prstGeom prst="rect">
+            <a:avLst/>
+          </a:prstGeom>
+          <a:ln>
+            <a:solidFill>
+              <a:srgbClr val="0070C0"/>
+            </a:solidFill>
+          </a:ln>
+        </p:spPr>
+      </p:pic>
+      <p:pic>
+        <p:nvPicPr>
+          <p:cNvPr id="1026" name="Picture 2">
+            <a:extLst>
+              <a:ext uri="{FF2B5EF4-FFF2-40B4-BE49-F238E27FC236}">
+                <a16:creationId xmlns:a16="http://schemas.microsoft.com/office/drawing/2014/main" id="{3B2A314F-D7A1-4247-A824-7ED06F6C795E}"/>
+              </a:ext>
+            </a:extLst>
+          </p:cNvPr>
+          <p:cNvPicPr>
+            <a:picLocks noChangeAspect="1" noChangeArrowheads="1"/>
+          </p:cNvPicPr>
+          <p:nvPr/>
+        </p:nvPicPr>
+        <p:blipFill>
+          <a:blip r:embed="rId4">
+            <a:extLst>
+              <a:ext uri="{28A0092B-C50C-407E-A947-70E740481C1C}">
+                <a14:useLocalDpi xmlns:a14="http://schemas.microsoft.com/office/drawing/2010/main" val="0"/>
+              </a:ext>
+            </a:extLst>
+          </a:blip>
+          <a:srcRect/>
+          <a:stretch>
+            <a:fillRect/>
+          </a:stretch>
+        </p:blipFill>
+        <p:spPr bwMode="auto">
+          <a:xfrm>
+            <a:off x="3594870" y="677990"/>
+            <a:ext cx="2242317" cy="2242317"/>
+          </a:xfrm>
+          <a:prstGeom prst="rect">
+            <a:avLst/>
+          </a:prstGeom>
+          <a:noFill/>
+          <a:ln>
+            <a:solidFill>
+              <a:srgbClr val="0070C0"/>
+            </a:solidFill>
+          </a:ln>
+          <a:extLst>
+            <a:ext uri="{909E8E84-426E-40DD-AFC4-6F175D3DCCD1}">
+              <a14:hiddenFill xmlns:a14="http://schemas.microsoft.com/office/drawing/2010/main">
+                <a:solidFill>
+                  <a:srgbClr val="FFFFFF"/>
+                </a:solidFill>
+              </a14:hiddenFill>
+            </a:ext>
+          </a:extLst>
+        </p:spPr>
+      </p:pic>
+      <p:sp>
+        <p:nvSpPr>
+          <p:cNvPr id="2" name="TextBox 1">
+            <a:extLst>
+              <a:ext uri="{FF2B5EF4-FFF2-40B4-BE49-F238E27FC236}">
+                <a16:creationId xmlns:a16="http://schemas.microsoft.com/office/drawing/2014/main" id="{BA541CB7-EE52-4D05-AA4B-1B5BF6A6371B}"/>
+              </a:ext>
+            </a:extLst>
+          </p:cNvPr>
+          <p:cNvSpPr txBox="1"/>
+          <p:nvPr/>
+        </p:nvSpPr>
+        <p:spPr>
+          <a:xfrm>
+            <a:off x="3585817" y="2273977"/>
+            <a:ext cx="1818383" cy="646331"/>
+          </a:xfrm>
+          <a:prstGeom prst="rect">
+            <a:avLst/>
+          </a:prstGeom>
+          <a:noFill/>
+        </p:spPr>
+        <p:txBody>
+          <a:bodyPr wrap="none" rtlCol="0">
+            <a:spAutoFit/>
+          </a:bodyPr>
+          <a:lstStyle/>
+          <a:p>
+            <a:r>
+              <a:rPr lang="en-US" b="1" dirty="0">
+                <a:solidFill>
+                  <a:schemeClr val="bg1"/>
+                </a:solidFill>
+              </a:rPr>
+              <a:t>Label</a:t>
+            </a:r>
+            <a:r>
+              <a:rPr lang="en-US" dirty="0">
+                <a:solidFill>
+                  <a:schemeClr val="bg1"/>
+                </a:solidFill>
+              </a:rPr>
+              <a:t>: cup</a:t>
+            </a:r>
+            <a:br>
+              <a:rPr lang="en-US" dirty="0">
+                <a:solidFill>
+                  <a:schemeClr val="bg1"/>
+                </a:solidFill>
+              </a:rPr>
+            </a:br>
+            <a:r>
+              <a:rPr lang="en-US" b="1" dirty="0">
+                <a:solidFill>
+                  <a:schemeClr val="bg1"/>
+                </a:solidFill>
+              </a:rPr>
+              <a:t>Confidence</a:t>
+            </a:r>
+            <a:r>
+              <a:rPr lang="en-US" dirty="0">
+                <a:solidFill>
+                  <a:schemeClr val="bg1"/>
+                </a:solidFill>
+              </a:rPr>
+              <a:t>: 99%</a:t>
+            </a:r>
+          </a:p>
+        </p:txBody>
+      </p:sp>
+      <p:pic>
+        <p:nvPicPr>
+          <p:cNvPr id="7" name="Picture 6">
+            <a:extLst>
+              <a:ext uri="{FF2B5EF4-FFF2-40B4-BE49-F238E27FC236}">
+                <a16:creationId xmlns:a16="http://schemas.microsoft.com/office/drawing/2014/main" id="{4C885915-58C6-4EF0-A156-7DDFAD179D8C}"/>
+              </a:ext>
+            </a:extLst>
+          </p:cNvPr>
+          <p:cNvPicPr>
+            <a:picLocks noChangeAspect="1"/>
+          </p:cNvPicPr>
+          <p:nvPr/>
+        </p:nvPicPr>
+        <p:blipFill>
+          <a:blip r:embed="rId5"/>
+          <a:stretch>
+            <a:fillRect/>
+          </a:stretch>
+        </p:blipFill>
+        <p:spPr>
+          <a:xfrm>
+            <a:off x="5946083" y="677988"/>
+            <a:ext cx="1653460" cy="2242319"/>
+          </a:xfrm>
+          <a:prstGeom prst="rect">
+            <a:avLst/>
+          </a:prstGeom>
+          <a:ln>
+            <a:solidFill>
+              <a:srgbClr val="0070C0"/>
+            </a:solidFill>
+          </a:ln>
+        </p:spPr>
+      </p:pic>
+      <p:pic>
+        <p:nvPicPr>
+          <p:cNvPr id="5" name="Picture 4">
+            <a:extLst>
+              <a:ext uri="{FF2B5EF4-FFF2-40B4-BE49-F238E27FC236}">
+                <a16:creationId xmlns:a16="http://schemas.microsoft.com/office/drawing/2014/main" id="{E6AA9F17-3394-4F2B-BAEC-44872FC2618B}"/>
+              </a:ext>
+            </a:extLst>
+          </p:cNvPr>
+          <p:cNvPicPr>
+            <a:picLocks noChangeAspect="1"/>
+          </p:cNvPicPr>
+          <p:nvPr/>
+        </p:nvPicPr>
+        <p:blipFill>
+          <a:blip r:embed="rId6"/>
+          <a:stretch>
+            <a:fillRect/>
+          </a:stretch>
+        </p:blipFill>
+        <p:spPr>
+          <a:xfrm>
+            <a:off x="7721108" y="677988"/>
+            <a:ext cx="1674571" cy="2242319"/>
+          </a:xfrm>
+          <a:prstGeom prst="rect">
+            <a:avLst/>
+          </a:prstGeom>
+          <a:ln>
+            <a:solidFill>
+              <a:srgbClr val="0070C0"/>
+            </a:solidFill>
+          </a:ln>
+        </p:spPr>
+      </p:pic>
+      <p:pic>
+        <p:nvPicPr>
+          <p:cNvPr id="10" name="Picture 9">
+            <a:extLst>
+              <a:ext uri="{FF2B5EF4-FFF2-40B4-BE49-F238E27FC236}">
+                <a16:creationId xmlns:a16="http://schemas.microsoft.com/office/drawing/2014/main" id="{33DC3F42-D9BE-4B2F-85FD-1BE242B98ABE}"/>
+              </a:ext>
+            </a:extLst>
+          </p:cNvPr>
+          <p:cNvPicPr>
+            <a:picLocks noChangeAspect="1"/>
+          </p:cNvPicPr>
+          <p:nvPr/>
+        </p:nvPicPr>
+        <p:blipFill>
+          <a:blip r:embed="rId7"/>
+          <a:stretch>
+            <a:fillRect/>
+          </a:stretch>
+        </p:blipFill>
+        <p:spPr>
+          <a:xfrm>
+            <a:off x="717005" y="3005659"/>
+            <a:ext cx="6502401" cy="1946962"/>
+          </a:xfrm>
+          <a:prstGeom prst="rect">
+            <a:avLst/>
+          </a:prstGeom>
+          <a:ln>
+            <a:solidFill>
+              <a:srgbClr val="0070C0"/>
+            </a:solidFill>
+          </a:ln>
+        </p:spPr>
+      </p:pic>
+    </p:spTree>
+    <p:extLst>
+      <p:ext uri="{BB962C8B-B14F-4D97-AF65-F5344CB8AC3E}">
+        <p14:creationId xmlns:p14="http://schemas.microsoft.com/office/powerpoint/2010/main" val="1758385637"/>
+      </p:ext>
+    </p:extLst>
+  </p:cSld>
+  <p:clrMapOvr>
+    <a:masterClrMapping/>
+  </p:clrMapOvr>
+</p:sld>
+</file>
+
+<file path=ppt/slides/slide9.xml><?xml version="1.0" encoding="utf-8"?>
+<p:sld xmlns:a="http://schemas.openxmlformats.org/drawingml/2006/main" xmlns:r="http://schemas.openxmlformats.org/officeDocument/2006/relationships" xmlns:p="http://schemas.openxmlformats.org/presentationml/2006/main">
+  <p:cSld>
+    <p:spTree>
+      <p:nvGrpSpPr>
+        <p:cNvPr id="1" name=""/>
+        <p:cNvGrpSpPr/>
+        <p:nvPr/>
+      </p:nvGrpSpPr>
+      <p:grpSpPr>
+        <a:xfrm>
+          <a:off x="0" y="0"/>
+          <a:ext cx="0" cy="0"/>
+          <a:chOff x="0" y="0"/>
+          <a:chExt cx="0" cy="0"/>
+        </a:xfrm>
+      </p:grpSpPr>
+      <p:pic>
+        <p:nvPicPr>
           <p:cNvPr id="5" name="Picture 4" descr="A plastic water bottle on a table&#10;&#10;Description automatically generated">
             <a:extLst>
               <a:ext uri="{FF2B5EF4-FFF2-40B4-BE49-F238E27FC236}">

</xml_diff>

<commit_message>
Adding image segmentation 01 and 11 notebooks
</commit_message>
<xml_diff>
--- a/scenarios/media/figures.pptx
+++ b/scenarios/media/figures.pptx
@@ -12,7 +12,8 @@
     <p:sldId id="258" r:id="rId6"/>
     <p:sldId id="259" r:id="rId7"/>
     <p:sldId id="1449" r:id="rId8"/>
-    <p:sldId id="1450" r:id="rId9"/>
+    <p:sldId id="1451" r:id="rId9"/>
+    <p:sldId id="1450" r:id="rId10"/>
   </p:sldIdLst>
   <p:sldSz cx="12192000" cy="6858000"/>
   <p:notesSz cx="6858000" cy="9144000"/>
@@ -266,7 +267,7 @@
           <a:p>
             <a:fld id="{4A8D7B51-23EF-4970-8150-2BD12F42C3C7}" type="datetimeFigureOut">
               <a:rPr lang="en-US" smtClean="0"/>
-              <a:t>2/5/2020</a:t>
+              <a:t>6/9/2020</a:t>
             </a:fld>
             <a:endParaRPr lang="en-US"/>
           </a:p>
@@ -464,7 +465,7 @@
           <a:p>
             <a:fld id="{4A8D7B51-23EF-4970-8150-2BD12F42C3C7}" type="datetimeFigureOut">
               <a:rPr lang="en-US" smtClean="0"/>
-              <a:t>2/5/2020</a:t>
+              <a:t>6/9/2020</a:t>
             </a:fld>
             <a:endParaRPr lang="en-US"/>
           </a:p>
@@ -672,7 +673,7 @@
           <a:p>
             <a:fld id="{4A8D7B51-23EF-4970-8150-2BD12F42C3C7}" type="datetimeFigureOut">
               <a:rPr lang="en-US" smtClean="0"/>
-              <a:t>2/5/2020</a:t>
+              <a:t>6/9/2020</a:t>
             </a:fld>
             <a:endParaRPr lang="en-US"/>
           </a:p>
@@ -870,7 +871,7 @@
           <a:p>
             <a:fld id="{4A8D7B51-23EF-4970-8150-2BD12F42C3C7}" type="datetimeFigureOut">
               <a:rPr lang="en-US" smtClean="0"/>
-              <a:t>2/5/2020</a:t>
+              <a:t>6/9/2020</a:t>
             </a:fld>
             <a:endParaRPr lang="en-US"/>
           </a:p>
@@ -1145,7 +1146,7 @@
           <a:p>
             <a:fld id="{4A8D7B51-23EF-4970-8150-2BD12F42C3C7}" type="datetimeFigureOut">
               <a:rPr lang="en-US" smtClean="0"/>
-              <a:t>2/5/2020</a:t>
+              <a:t>6/9/2020</a:t>
             </a:fld>
             <a:endParaRPr lang="en-US"/>
           </a:p>
@@ -1410,7 +1411,7 @@
           <a:p>
             <a:fld id="{4A8D7B51-23EF-4970-8150-2BD12F42C3C7}" type="datetimeFigureOut">
               <a:rPr lang="en-US" smtClean="0"/>
-              <a:t>2/5/2020</a:t>
+              <a:t>6/9/2020</a:t>
             </a:fld>
             <a:endParaRPr lang="en-US"/>
           </a:p>
@@ -1822,7 +1823,7 @@
           <a:p>
             <a:fld id="{4A8D7B51-23EF-4970-8150-2BD12F42C3C7}" type="datetimeFigureOut">
               <a:rPr lang="en-US" smtClean="0"/>
-              <a:t>2/5/2020</a:t>
+              <a:t>6/9/2020</a:t>
             </a:fld>
             <a:endParaRPr lang="en-US"/>
           </a:p>
@@ -1963,7 +1964,7 @@
           <a:p>
             <a:fld id="{4A8D7B51-23EF-4970-8150-2BD12F42C3C7}" type="datetimeFigureOut">
               <a:rPr lang="en-US" smtClean="0"/>
-              <a:t>2/5/2020</a:t>
+              <a:t>6/9/2020</a:t>
             </a:fld>
             <a:endParaRPr lang="en-US"/>
           </a:p>
@@ -2076,7 +2077,7 @@
           <a:p>
             <a:fld id="{4A8D7B51-23EF-4970-8150-2BD12F42C3C7}" type="datetimeFigureOut">
               <a:rPr lang="en-US" smtClean="0"/>
-              <a:t>2/5/2020</a:t>
+              <a:t>6/9/2020</a:t>
             </a:fld>
             <a:endParaRPr lang="en-US"/>
           </a:p>
@@ -2387,7 +2388,7 @@
           <a:p>
             <a:fld id="{4A8D7B51-23EF-4970-8150-2BD12F42C3C7}" type="datetimeFigureOut">
               <a:rPr lang="en-US" smtClean="0"/>
-              <a:t>2/5/2020</a:t>
+              <a:t>6/9/2020</a:t>
             </a:fld>
             <a:endParaRPr lang="en-US"/>
           </a:p>
@@ -2675,7 +2676,7 @@
           <a:p>
             <a:fld id="{4A8D7B51-23EF-4970-8150-2BD12F42C3C7}" type="datetimeFigureOut">
               <a:rPr lang="en-US" smtClean="0"/>
-              <a:t>2/5/2020</a:t>
+              <a:t>6/9/2020</a:t>
             </a:fld>
             <a:endParaRPr lang="en-US"/>
           </a:p>
@@ -2916,7 +2917,7 @@
           <a:p>
             <a:fld id="{4A8D7B51-23EF-4970-8150-2BD12F42C3C7}" type="datetimeFigureOut">
               <a:rPr lang="en-US" smtClean="0"/>
-              <a:t>2/5/2020</a:t>
+              <a:t>6/9/2020</a:t>
             </a:fld>
             <a:endParaRPr lang="en-US"/>
           </a:p>
@@ -5777,6 +5778,350 @@
       </p:grpSpPr>
       <p:pic>
         <p:nvPicPr>
+          <p:cNvPr id="4" name="Picture 6">
+            <a:extLst>
+              <a:ext uri="{FF2B5EF4-FFF2-40B4-BE49-F238E27FC236}">
+                <a16:creationId xmlns:a16="http://schemas.microsoft.com/office/drawing/2014/main" id="{C76889AB-A7B7-4F7D-A711-44B611B2B9B2}"/>
+              </a:ext>
+            </a:extLst>
+          </p:cNvPr>
+          <p:cNvPicPr>
+            <a:picLocks noChangeAspect="1" noChangeArrowheads="1"/>
+          </p:cNvPicPr>
+          <p:nvPr/>
+        </p:nvPicPr>
+        <p:blipFill>
+          <a:blip r:embed="rId2">
+            <a:extLst>
+              <a:ext uri="{28A0092B-C50C-407E-A947-70E740481C1C}">
+                <a14:useLocalDpi xmlns:a14="http://schemas.microsoft.com/office/drawing/2010/main" val="0"/>
+              </a:ext>
+            </a:extLst>
+          </a:blip>
+          <a:srcRect/>
+          <a:stretch>
+            <a:fillRect/>
+          </a:stretch>
+        </p:blipFill>
+        <p:spPr bwMode="auto">
+          <a:xfrm>
+            <a:off x="7324111" y="3005657"/>
+            <a:ext cx="2071568" cy="1946961"/>
+          </a:xfrm>
+          <a:prstGeom prst="rect">
+            <a:avLst/>
+          </a:prstGeom>
+          <a:noFill/>
+          <a:ln>
+            <a:solidFill>
+              <a:srgbClr val="0070C0"/>
+            </a:solidFill>
+          </a:ln>
+          <a:extLst>
+            <a:ext uri="{909E8E84-426E-40DD-AFC4-6F175D3DCCD1}">
+              <a14:hiddenFill xmlns:a14="http://schemas.microsoft.com/office/drawing/2010/main">
+                <a:solidFill>
+                  <a:srgbClr val="FFFFFF"/>
+                </a:solidFill>
+              </a14:hiddenFill>
+            </a:ext>
+          </a:extLst>
+        </p:spPr>
+      </p:pic>
+      <p:pic>
+        <p:nvPicPr>
+          <p:cNvPr id="8" name="Picture 7">
+            <a:extLst>
+              <a:ext uri="{FF2B5EF4-FFF2-40B4-BE49-F238E27FC236}">
+                <a16:creationId xmlns:a16="http://schemas.microsoft.com/office/drawing/2014/main" id="{80D2613F-75BB-4C54-B2DB-B87FD52E3412}"/>
+              </a:ext>
+            </a:extLst>
+          </p:cNvPr>
+          <p:cNvPicPr>
+            <a:picLocks noChangeAspect="1"/>
+          </p:cNvPicPr>
+          <p:nvPr/>
+        </p:nvPicPr>
+        <p:blipFill>
+          <a:blip r:embed="rId3"/>
+          <a:stretch>
+            <a:fillRect/>
+          </a:stretch>
+        </p:blipFill>
+        <p:spPr>
+          <a:xfrm>
+            <a:off x="725714" y="677992"/>
+            <a:ext cx="2760260" cy="2242317"/>
+          </a:xfrm>
+          <a:prstGeom prst="rect">
+            <a:avLst/>
+          </a:prstGeom>
+          <a:ln>
+            <a:solidFill>
+              <a:srgbClr val="0070C0"/>
+            </a:solidFill>
+          </a:ln>
+        </p:spPr>
+      </p:pic>
+      <p:pic>
+        <p:nvPicPr>
+          <p:cNvPr id="1026" name="Picture 2">
+            <a:extLst>
+              <a:ext uri="{FF2B5EF4-FFF2-40B4-BE49-F238E27FC236}">
+                <a16:creationId xmlns:a16="http://schemas.microsoft.com/office/drawing/2014/main" id="{3B2A314F-D7A1-4247-A824-7ED06F6C795E}"/>
+              </a:ext>
+            </a:extLst>
+          </p:cNvPr>
+          <p:cNvPicPr>
+            <a:picLocks noChangeAspect="1" noChangeArrowheads="1"/>
+          </p:cNvPicPr>
+          <p:nvPr/>
+        </p:nvPicPr>
+        <p:blipFill>
+          <a:blip r:embed="rId4">
+            <a:extLst>
+              <a:ext uri="{28A0092B-C50C-407E-A947-70E740481C1C}">
+                <a14:useLocalDpi xmlns:a14="http://schemas.microsoft.com/office/drawing/2010/main" val="0"/>
+              </a:ext>
+            </a:extLst>
+          </a:blip>
+          <a:srcRect/>
+          <a:stretch>
+            <a:fillRect/>
+          </a:stretch>
+        </p:blipFill>
+        <p:spPr bwMode="auto">
+          <a:xfrm>
+            <a:off x="3594870" y="677990"/>
+            <a:ext cx="2242317" cy="2242317"/>
+          </a:xfrm>
+          <a:prstGeom prst="rect">
+            <a:avLst/>
+          </a:prstGeom>
+          <a:noFill/>
+          <a:ln>
+            <a:solidFill>
+              <a:srgbClr val="0070C0"/>
+            </a:solidFill>
+          </a:ln>
+          <a:extLst>
+            <a:ext uri="{909E8E84-426E-40DD-AFC4-6F175D3DCCD1}">
+              <a14:hiddenFill xmlns:a14="http://schemas.microsoft.com/office/drawing/2010/main">
+                <a:solidFill>
+                  <a:srgbClr val="FFFFFF"/>
+                </a:solidFill>
+              </a14:hiddenFill>
+            </a:ext>
+          </a:extLst>
+        </p:spPr>
+      </p:pic>
+      <p:sp>
+        <p:nvSpPr>
+          <p:cNvPr id="2" name="TextBox 1">
+            <a:extLst>
+              <a:ext uri="{FF2B5EF4-FFF2-40B4-BE49-F238E27FC236}">
+                <a16:creationId xmlns:a16="http://schemas.microsoft.com/office/drawing/2014/main" id="{BA541CB7-EE52-4D05-AA4B-1B5BF6A6371B}"/>
+              </a:ext>
+            </a:extLst>
+          </p:cNvPr>
+          <p:cNvSpPr txBox="1"/>
+          <p:nvPr/>
+        </p:nvSpPr>
+        <p:spPr>
+          <a:xfrm>
+            <a:off x="3585817" y="2273977"/>
+            <a:ext cx="1818383" cy="646331"/>
+          </a:xfrm>
+          <a:prstGeom prst="rect">
+            <a:avLst/>
+          </a:prstGeom>
+          <a:noFill/>
+        </p:spPr>
+        <p:txBody>
+          <a:bodyPr wrap="none" rtlCol="0">
+            <a:spAutoFit/>
+          </a:bodyPr>
+          <a:lstStyle/>
+          <a:p>
+            <a:r>
+              <a:rPr lang="en-US" b="1" dirty="0">
+                <a:solidFill>
+                  <a:schemeClr val="bg1"/>
+                </a:solidFill>
+              </a:rPr>
+              <a:t>Label</a:t>
+            </a:r>
+            <a:r>
+              <a:rPr lang="en-US" dirty="0">
+                <a:solidFill>
+                  <a:schemeClr val="bg1"/>
+                </a:solidFill>
+              </a:rPr>
+              <a:t>: cup</a:t>
+            </a:r>
+            <a:br>
+              <a:rPr lang="en-US" dirty="0">
+                <a:solidFill>
+                  <a:schemeClr val="bg1"/>
+                </a:solidFill>
+              </a:rPr>
+            </a:br>
+            <a:r>
+              <a:rPr lang="en-US" b="1" dirty="0">
+                <a:solidFill>
+                  <a:schemeClr val="bg1"/>
+                </a:solidFill>
+              </a:rPr>
+              <a:t>Confidence</a:t>
+            </a:r>
+            <a:r>
+              <a:rPr lang="en-US" dirty="0">
+                <a:solidFill>
+                  <a:schemeClr val="bg1"/>
+                </a:solidFill>
+              </a:rPr>
+              <a:t>: 99%</a:t>
+            </a:r>
+          </a:p>
+        </p:txBody>
+      </p:sp>
+      <p:pic>
+        <p:nvPicPr>
+          <p:cNvPr id="7" name="Picture 6">
+            <a:extLst>
+              <a:ext uri="{FF2B5EF4-FFF2-40B4-BE49-F238E27FC236}">
+                <a16:creationId xmlns:a16="http://schemas.microsoft.com/office/drawing/2014/main" id="{4C885915-58C6-4EF0-A156-7DDFAD179D8C}"/>
+              </a:ext>
+            </a:extLst>
+          </p:cNvPr>
+          <p:cNvPicPr>
+            <a:picLocks noChangeAspect="1"/>
+          </p:cNvPicPr>
+          <p:nvPr/>
+        </p:nvPicPr>
+        <p:blipFill>
+          <a:blip r:embed="rId5"/>
+          <a:stretch>
+            <a:fillRect/>
+          </a:stretch>
+        </p:blipFill>
+        <p:spPr>
+          <a:xfrm>
+            <a:off x="5946083" y="677988"/>
+            <a:ext cx="1653460" cy="2242319"/>
+          </a:xfrm>
+          <a:prstGeom prst="rect">
+            <a:avLst/>
+          </a:prstGeom>
+          <a:ln>
+            <a:solidFill>
+              <a:srgbClr val="0070C0"/>
+            </a:solidFill>
+          </a:ln>
+        </p:spPr>
+      </p:pic>
+      <p:pic>
+        <p:nvPicPr>
+          <p:cNvPr id="5" name="Picture 4">
+            <a:extLst>
+              <a:ext uri="{FF2B5EF4-FFF2-40B4-BE49-F238E27FC236}">
+                <a16:creationId xmlns:a16="http://schemas.microsoft.com/office/drawing/2014/main" id="{E6AA9F17-3394-4F2B-BAEC-44872FC2618B}"/>
+              </a:ext>
+            </a:extLst>
+          </p:cNvPr>
+          <p:cNvPicPr>
+            <a:picLocks noChangeAspect="1"/>
+          </p:cNvPicPr>
+          <p:nvPr/>
+        </p:nvPicPr>
+        <p:blipFill>
+          <a:blip r:embed="rId6"/>
+          <a:stretch>
+            <a:fillRect/>
+          </a:stretch>
+        </p:blipFill>
+        <p:spPr>
+          <a:xfrm>
+            <a:off x="7721108" y="677988"/>
+            <a:ext cx="1674571" cy="2242319"/>
+          </a:xfrm>
+          <a:prstGeom prst="rect">
+            <a:avLst/>
+          </a:prstGeom>
+          <a:ln>
+            <a:solidFill>
+              <a:srgbClr val="0070C0"/>
+            </a:solidFill>
+          </a:ln>
+        </p:spPr>
+      </p:pic>
+      <p:pic>
+        <p:nvPicPr>
+          <p:cNvPr id="10" name="Picture 9">
+            <a:extLst>
+              <a:ext uri="{FF2B5EF4-FFF2-40B4-BE49-F238E27FC236}">
+                <a16:creationId xmlns:a16="http://schemas.microsoft.com/office/drawing/2014/main" id="{33DC3F42-D9BE-4B2F-85FD-1BE242B98ABE}"/>
+              </a:ext>
+            </a:extLst>
+          </p:cNvPr>
+          <p:cNvPicPr>
+            <a:picLocks noChangeAspect="1"/>
+          </p:cNvPicPr>
+          <p:nvPr/>
+        </p:nvPicPr>
+        <p:blipFill>
+          <a:blip r:embed="rId7"/>
+          <a:stretch>
+            <a:fillRect/>
+          </a:stretch>
+        </p:blipFill>
+        <p:spPr>
+          <a:xfrm>
+            <a:off x="717005" y="3005659"/>
+            <a:ext cx="6502401" cy="1946962"/>
+          </a:xfrm>
+          <a:prstGeom prst="rect">
+            <a:avLst/>
+          </a:prstGeom>
+          <a:ln>
+            <a:solidFill>
+              <a:srgbClr val="0070C0"/>
+            </a:solidFill>
+          </a:ln>
+        </p:spPr>
+      </p:pic>
+    </p:spTree>
+    <p:extLst>
+      <p:ext uri="{BB962C8B-B14F-4D97-AF65-F5344CB8AC3E}">
+        <p14:creationId xmlns:p14="http://schemas.microsoft.com/office/powerpoint/2010/main" val="1758385637"/>
+      </p:ext>
+    </p:extLst>
+  </p:cSld>
+  <p:clrMapOvr>
+    <a:masterClrMapping/>
+  </p:clrMapOvr>
+</p:sld>
+</file>
+
+<file path=ppt/slides/slide9.xml><?xml version="1.0" encoding="utf-8"?>
+<p:sld xmlns:a="http://schemas.openxmlformats.org/drawingml/2006/main" xmlns:r="http://schemas.openxmlformats.org/officeDocument/2006/relationships" xmlns:p="http://schemas.openxmlformats.org/presentationml/2006/main">
+  <p:cSld>
+    <p:spTree>
+      <p:nvGrpSpPr>
+        <p:cNvPr id="1" name=""/>
+        <p:cNvGrpSpPr/>
+        <p:nvPr/>
+      </p:nvGrpSpPr>
+      <p:grpSpPr>
+        <a:xfrm>
+          <a:off x="0" y="0"/>
+          <a:ext cx="0" cy="0"/>
+          <a:chOff x="0" y="0"/>
+          <a:chExt cx="0" cy="0"/>
+        </a:xfrm>
+      </p:grpSpPr>
+      <p:pic>
+        <p:nvPicPr>
           <p:cNvPr id="5" name="Picture 4" descr="A plastic water bottle on a table&#10;&#10;Description automatically generated">
             <a:extLst>
               <a:ext uri="{FF2B5EF4-FFF2-40B4-BE49-F238E27FC236}">

</xml_diff>